<commit_message>
Major update of weeks remaining.
</commit_message>
<xml_diff>
--- a/Weeklies/Week_19/slides/Workshop2.pptx
+++ b/Weeklies/Week_19/slides/Workshop2.pptx
@@ -5,12 +5,13 @@
     <p:sldMasterId id="2147483755" r:id="rId1"/>
   </p:sldMasterIdLst>
   <p:notesMasterIdLst>
-    <p:notesMasterId r:id="rId5"/>
+    <p:notesMasterId r:id="rId6"/>
   </p:notesMasterIdLst>
   <p:sldIdLst>
     <p:sldId id="256" r:id="rId2"/>
     <p:sldId id="257" r:id="rId3"/>
-    <p:sldId id="258" r:id="rId4"/>
+    <p:sldId id="265" r:id="rId4"/>
+    <p:sldId id="271" r:id="rId5"/>
   </p:sldIdLst>
   <p:sldSz cx="9144000" cy="5715000" type="screen16x10"/>
   <p:notesSz cx="6858000" cy="9144000"/>
@@ -198,7 +199,7 @@
           </a:lstStyle>
           <a:p>
             <a:fld id="{DD7F552D-4D31-2447-9D5F-190524270CEE}" type="datetimeFigureOut">
-              <a:t>29/04/2019</a:t>
+              <a:t>05/05/2019</a:t>
             </a:fld>
             <a:endParaRPr lang="da-DK"/>
           </a:p>
@@ -625,7 +626,7 @@
           </a:lstStyle>
           <a:p>
             <a:fld id="{6D5C89AF-383A-BF4F-98FF-BA269255BF7D}" type="datetime1">
-              <a:t>29/04/2019</a:t>
+              <a:t>05/05/2019</a:t>
             </a:fld>
             <a:endParaRPr lang="da-DK" dirty="0"/>
           </a:p>
@@ -946,7 +947,7 @@
           <a:lstStyle/>
           <a:p>
             <a:fld id="{55B09ED3-5314-5442-9427-F38A9EDB2BBB}" type="datetime1">
-              <a:t>29/04/2019</a:t>
+              <a:t>05/05/2019</a:t>
             </a:fld>
             <a:endParaRPr lang="da-DK"/>
           </a:p>
@@ -1145,7 +1146,7 @@
           <a:lstStyle/>
           <a:p>
             <a:fld id="{393A28AA-63B0-3248-8D76-06B65BEFE437}" type="datetime1">
-              <a:t>29/04/2019</a:t>
+              <a:t>05/05/2019</a:t>
             </a:fld>
             <a:endParaRPr lang="da-DK"/>
           </a:p>
@@ -1330,7 +1331,7 @@
           <a:lstStyle/>
           <a:p>
             <a:fld id="{1F043785-D290-9748-90A7-A1F399B02572}" type="datetime1">
-              <a:t>29/04/2019</a:t>
+              <a:t>05/05/2019</a:t>
             </a:fld>
             <a:endParaRPr lang="da-DK"/>
           </a:p>
@@ -1591,7 +1592,7 @@
           <a:lstStyle/>
           <a:p>
             <a:fld id="{46D16C79-8F3F-C64B-8E6F-CF499655C6CE}" type="datetime1">
-              <a:t>29/04/2019</a:t>
+              <a:t>05/05/2019</a:t>
             </a:fld>
             <a:endParaRPr lang="da-DK"/>
           </a:p>
@@ -1842,7 +1843,7 @@
           <a:lstStyle/>
           <a:p>
             <a:fld id="{C181C5FD-8A15-534C-8E93-0C922FFEDA90}" type="datetime1">
-              <a:t>29/04/2019</a:t>
+              <a:t>05/05/2019</a:t>
             </a:fld>
             <a:endParaRPr lang="da-DK"/>
           </a:p>
@@ -2223,7 +2224,7 @@
           <a:lstStyle/>
           <a:p>
             <a:fld id="{33703AD6-5E9C-0442-9035-CF7CBA45DEFE}" type="datetime1">
-              <a:t>29/04/2019</a:t>
+              <a:t>05/05/2019</a:t>
             </a:fld>
             <a:endParaRPr lang="da-DK"/>
           </a:p>
@@ -2361,7 +2362,7 @@
           <a:lstStyle/>
           <a:p>
             <a:fld id="{6F114362-2D21-5B46-9359-6F295ED7BA16}" type="datetime1">
-              <a:t>29/04/2019</a:t>
+              <a:t>05/05/2019</a:t>
             </a:fld>
             <a:endParaRPr lang="da-DK"/>
           </a:p>
@@ -2471,7 +2472,7 @@
           <a:lstStyle/>
           <a:p>
             <a:fld id="{B394E387-CFEA-E445-AE94-E6ABABC209CC}" type="datetime1">
-              <a:t>29/04/2019</a:t>
+              <a:t>05/05/2019</a:t>
             </a:fld>
             <a:endParaRPr lang="da-DK"/>
           </a:p>
@@ -2763,7 +2764,7 @@
           <a:lstStyle/>
           <a:p>
             <a:fld id="{DBF4E038-F866-5041-AD52-56DC4D3D144C}" type="datetime1">
-              <a:t>29/04/2019</a:t>
+              <a:t>05/05/2019</a:t>
             </a:fld>
             <a:endParaRPr lang="da-DK"/>
           </a:p>
@@ -3034,7 +3035,7 @@
           <a:lstStyle/>
           <a:p>
             <a:fld id="{493AFDF1-BF63-3B44-8407-3A4DFC0EC021}" type="datetime1">
-              <a:t>29/04/2019</a:t>
+              <a:t>05/05/2019</a:t>
             </a:fld>
             <a:endParaRPr lang="da-DK"/>
           </a:p>
@@ -3270,7 +3271,7 @@
           </a:lstStyle>
           <a:p>
             <a:fld id="{E76AA8C3-2D33-F74D-AAA5-75C5F894B128}" type="datetime1">
-              <a:t>29/04/2019</a:t>
+              <a:t>05/05/2019</a:t>
             </a:fld>
             <a:endParaRPr lang="da-DK"/>
           </a:p>
@@ -3773,7 +3774,7 @@
           <a:p>
             <a:r>
               <a:rPr lang="da-DK"/>
-              <a:t>Workshop Week 2</a:t>
+              <a:t>Workshop - Week 19</a:t>
             </a:r>
           </a:p>
         </p:txBody>
@@ -3871,7 +3872,10 @@
           <a:bodyPr/>
           <a:lstStyle/>
           <a:p>
-            <a:endParaRPr lang="da-DK"/>
+            <a:r>
+              <a:rPr lang="da-DK"/>
+              <a:t>Program, Week 19</a:t>
+            </a:r>
           </a:p>
         </p:txBody>
       </p:sp>
@@ -3893,10 +3897,49 @@
         </p:nvSpPr>
         <p:spPr/>
         <p:txBody>
-          <a:bodyPr/>
-          <a:lstStyle/>
-          <a:p>
-            <a:endParaRPr lang="da-DK"/>
+          <a:bodyPr>
+            <a:normAutofit/>
+          </a:bodyPr>
+          <a:lstStyle/>
+          <a:p>
+            <a:pPr marL="457200" indent="-457200">
+              <a:buFont typeface="+mj-lt"/>
+              <a:buAutoNum type="arabicPeriod"/>
+            </a:pPr>
+            <a:r>
+              <a:rPr lang="da-DK"/>
+              <a:t>Overview of last few weeks.</a:t>
+            </a:r>
+          </a:p>
+          <a:p>
+            <a:pPr marL="457200" indent="-457200">
+              <a:buFont typeface="+mj-lt"/>
+              <a:buAutoNum type="arabicPeriod"/>
+            </a:pPr>
+            <a:r>
+              <a:rPr lang="da-DK"/>
+              <a:t>Final choice of Project 5 topic, formulating the tasks/questions.</a:t>
+            </a:r>
+          </a:p>
+          <a:p>
+            <a:pPr marL="457200" indent="-457200">
+              <a:buFont typeface="+mj-lt"/>
+              <a:buAutoNum type="arabicPeriod"/>
+            </a:pPr>
+            <a:r>
+              <a:rPr lang="da-DK"/>
+              <a:t>Work in groups on Project 5.</a:t>
+            </a:r>
+          </a:p>
+          <a:p>
+            <a:pPr marL="457200" indent="-457200">
+              <a:buFont typeface="+mj-lt"/>
+              <a:buAutoNum type="arabicPeriod"/>
+            </a:pPr>
+            <a:r>
+              <a:rPr lang="da-DK"/>
+              <a:t>Choice of theory to review (if any? - your choice! :-) ).</a:t>
+            </a:r>
           </a:p>
         </p:txBody>
       </p:sp>
@@ -3922,7 +3965,7 @@
           <a:lstStyle/>
           <a:p>
             <a:fld id="{1F043785-D290-9748-90A7-A1F399B02572}" type="datetime1">
-              <a:t>29/04/2019</a:t>
+              <a:t>05/05/2019</a:t>
             </a:fld>
             <a:endParaRPr lang="da-DK"/>
           </a:p>
@@ -3989,7 +4032,7 @@
     </p:spTree>
     <p:extLst>
       <p:ext uri="{BB962C8B-B14F-4D97-AF65-F5344CB8AC3E}">
-        <p14:creationId xmlns:p14="http://schemas.microsoft.com/office/powerpoint/2010/main" val="482052709"/>
+        <p14:creationId xmlns:p14="http://schemas.microsoft.com/office/powerpoint/2010/main" val="2203581544"/>
       </p:ext>
     </p:extLst>
   </p:cSld>
@@ -4033,7 +4076,7 @@
           <p:cNvPr id="2" name="Title 1">
             <a:extLst>
               <a:ext uri="{FF2B5EF4-FFF2-40B4-BE49-F238E27FC236}">
-                <a16:creationId xmlns:a16="http://schemas.microsoft.com/office/drawing/2014/main" id="{EFC28642-77A0-1540-8100-BEC1BA142129}"/>
+                <a16:creationId xmlns:a16="http://schemas.microsoft.com/office/drawing/2014/main" id="{9A1D88A7-8799-4346-A84F-4F8210B00604}"/>
               </a:ext>
             </a:extLst>
           </p:cNvPr>
@@ -4046,44 +4089,66 @@
         </p:nvSpPr>
         <p:spPr/>
         <p:txBody>
-          <a:bodyPr/>
-          <a:lstStyle/>
-          <a:p>
-            <a:endParaRPr lang="da-DK"/>
-          </a:p>
-        </p:txBody>
-      </p:sp>
-      <p:sp>
-        <p:nvSpPr>
-          <p:cNvPr id="3" name="Content Placeholder 2">
+          <a:bodyPr>
+            <a:normAutofit/>
+          </a:bodyPr>
+          <a:lstStyle/>
+          <a:p>
+            <a:r>
+              <a:rPr lang="da-DK"/>
+              <a:t>Overview: the last weeks of the course </a:t>
+            </a:r>
+            <a:br>
+              <a:rPr lang="da-DK"/>
+            </a:br>
+            <a:r>
+              <a:rPr lang="da-DK" sz="1300" i="1"/>
+              <a:t>– ‘Looking for the summer...’ [Chris Rea]</a:t>
+            </a:r>
+            <a:endParaRPr lang="da-DK" i="1"/>
+          </a:p>
+        </p:txBody>
+      </p:sp>
+      <p:pic>
+        <p:nvPicPr>
+          <p:cNvPr id="8" name="Content Placeholder 7">
             <a:extLst>
               <a:ext uri="{FF2B5EF4-FFF2-40B4-BE49-F238E27FC236}">
-                <a16:creationId xmlns:a16="http://schemas.microsoft.com/office/drawing/2014/main" id="{21C7C2C9-F75F-9740-B097-6AA83CBE9F49}"/>
+                <a16:creationId xmlns:a16="http://schemas.microsoft.com/office/drawing/2014/main" id="{140CD155-58C6-AD4F-A75C-F5758543C06F}"/>
               </a:ext>
             </a:extLst>
           </p:cNvPr>
-          <p:cNvSpPr>
-            <a:spLocks noGrp="1"/>
-          </p:cNvSpPr>
+          <p:cNvPicPr>
+            <a:picLocks noGrp="1" noChangeAspect="1"/>
+          </p:cNvPicPr>
           <p:nvPr>
             <p:ph idx="1"/>
           </p:nvPr>
-        </p:nvSpPr>
-        <p:spPr/>
-        <p:txBody>
-          <a:bodyPr/>
-          <a:lstStyle/>
-          <a:p>
-            <a:endParaRPr lang="da-DK"/>
-          </a:p>
-        </p:txBody>
-      </p:sp>
+        </p:nvPicPr>
+        <p:blipFill>
+          <a:blip r:embed="rId2"/>
+          <a:stretch>
+            <a:fillRect/>
+          </a:stretch>
+        </p:blipFill>
+        <p:spPr>
+          <a:xfrm>
+            <a:off x="345967" y="2368848"/>
+            <a:ext cx="8452065" cy="1875701"/>
+          </a:xfrm>
+          <a:ln>
+            <a:solidFill>
+              <a:schemeClr val="tx1"/>
+            </a:solidFill>
+          </a:ln>
+        </p:spPr>
+      </p:pic>
       <p:sp>
         <p:nvSpPr>
           <p:cNvPr id="4" name="Date Placeholder 3">
             <a:extLst>
               <a:ext uri="{FF2B5EF4-FFF2-40B4-BE49-F238E27FC236}">
-                <a16:creationId xmlns:a16="http://schemas.microsoft.com/office/drawing/2014/main" id="{8A6BCF2D-38D6-5444-90C9-F97BB9D66AB7}"/>
+                <a16:creationId xmlns:a16="http://schemas.microsoft.com/office/drawing/2014/main" id="{C535C12C-A413-494E-885F-D541AF46ECB2}"/>
               </a:ext>
             </a:extLst>
           </p:cNvPr>
@@ -4100,7 +4165,8 @@
           <a:lstStyle/>
           <a:p>
             <a:fld id="{1F043785-D290-9748-90A7-A1F399B02572}" type="datetime1">
-              <a:t>29/04/2019</a:t>
+              <a:rPr lang="da-DK"/>
+              <a:t>05/05/2019</a:t>
             </a:fld>
             <a:endParaRPr lang="da-DK"/>
           </a:p>
@@ -4111,7 +4177,7 @@
           <p:cNvPr id="5" name="Footer Placeholder 4">
             <a:extLst>
               <a:ext uri="{FF2B5EF4-FFF2-40B4-BE49-F238E27FC236}">
-                <a16:creationId xmlns:a16="http://schemas.microsoft.com/office/drawing/2014/main" id="{41C957ED-1A23-1547-9BC8-5544BF259E76}"/>
+                <a16:creationId xmlns:a16="http://schemas.microsoft.com/office/drawing/2014/main" id="{2389351D-B289-FD45-90B3-5898D5D08988}"/>
               </a:ext>
             </a:extLst>
           </p:cNvPr>
@@ -4140,7 +4206,7 @@
           <p:cNvPr id="6" name="Slide Number Placeholder 5">
             <a:extLst>
               <a:ext uri="{FF2B5EF4-FFF2-40B4-BE49-F238E27FC236}">
-                <a16:creationId xmlns:a16="http://schemas.microsoft.com/office/drawing/2014/main" id="{DDE02DF1-7080-9445-A689-13DF31EEB381}"/>
+                <a16:creationId xmlns:a16="http://schemas.microsoft.com/office/drawing/2014/main" id="{DF477654-53AF-8249-B641-12A3C037F179}"/>
               </a:ext>
             </a:extLst>
           </p:cNvPr>
@@ -4167,7 +4233,286 @@
     </p:spTree>
     <p:extLst>
       <p:ext uri="{BB962C8B-B14F-4D97-AF65-F5344CB8AC3E}">
-        <p14:creationId xmlns:p14="http://schemas.microsoft.com/office/powerpoint/2010/main" val="1014849254"/>
+        <p14:creationId xmlns:p14="http://schemas.microsoft.com/office/powerpoint/2010/main" val="3076900031"/>
+      </p:ext>
+    </p:extLst>
+  </p:cSld>
+  <p:clrMapOvr>
+    <a:masterClrMapping/>
+  </p:clrMapOvr>
+  <mc:AlternateContent xmlns:mc="http://schemas.openxmlformats.org/markup-compatibility/2006" xmlns:p14="http://schemas.microsoft.com/office/powerpoint/2010/main">
+    <mc:Choice Requires="p14">
+      <p:transition spd="med" p14:dur="700">
+        <p:fade/>
+      </p:transition>
+    </mc:Choice>
+    <mc:Fallback xmlns="">
+      <p:transition spd="med">
+        <p:fade/>
+      </p:transition>
+    </mc:Fallback>
+  </mc:AlternateContent>
+</p:sld>
+</file>
+
+<file path=ppt/slides/slide4.xml><?xml version="1.0" encoding="utf-8"?>
+<p:sld xmlns:a="http://schemas.openxmlformats.org/drawingml/2006/main" xmlns:r="http://schemas.openxmlformats.org/officeDocument/2006/relationships" xmlns:p="http://schemas.openxmlformats.org/presentationml/2006/main">
+  <p:cSld>
+    <p:spTree>
+      <p:nvGrpSpPr>
+        <p:cNvPr id="1" name=""/>
+        <p:cNvGrpSpPr/>
+        <p:nvPr/>
+      </p:nvGrpSpPr>
+      <p:grpSpPr>
+        <a:xfrm>
+          <a:off x="0" y="0"/>
+          <a:ext cx="0" cy="0"/>
+          <a:chOff x="0" y="0"/>
+          <a:chExt cx="0" cy="0"/>
+        </a:xfrm>
+      </p:grpSpPr>
+      <p:sp>
+        <p:nvSpPr>
+          <p:cNvPr id="2" name="Title 1">
+            <a:extLst>
+              <a:ext uri="{FF2B5EF4-FFF2-40B4-BE49-F238E27FC236}">
+                <a16:creationId xmlns:a16="http://schemas.microsoft.com/office/drawing/2014/main" id="{EA34CBDE-04A2-0F49-BE43-2170DC3AEFBA}"/>
+              </a:ext>
+            </a:extLst>
+          </p:cNvPr>
+          <p:cNvSpPr>
+            <a:spLocks noGrp="1"/>
+          </p:cNvSpPr>
+          <p:nvPr>
+            <p:ph type="title"/>
+          </p:nvPr>
+        </p:nvSpPr>
+        <p:spPr/>
+        <p:txBody>
+          <a:bodyPr>
+            <a:normAutofit fontScale="90000"/>
+          </a:bodyPr>
+          <a:lstStyle/>
+          <a:p>
+            <a:r>
+              <a:rPr lang="da-DK"/>
+              <a:t>Project 5 – reaching a level of independence...</a:t>
+            </a:r>
+          </a:p>
+        </p:txBody>
+      </p:sp>
+      <p:sp>
+        <p:nvSpPr>
+          <p:cNvPr id="3" name="Content Placeholder 2">
+            <a:extLst>
+              <a:ext uri="{FF2B5EF4-FFF2-40B4-BE49-F238E27FC236}">
+                <a16:creationId xmlns:a16="http://schemas.microsoft.com/office/drawing/2014/main" id="{ACFBDF9F-28CA-B048-B2BE-F16670A304EC}"/>
+              </a:ext>
+            </a:extLst>
+          </p:cNvPr>
+          <p:cNvSpPr>
+            <a:spLocks noGrp="1"/>
+          </p:cNvSpPr>
+          <p:nvPr>
+            <p:ph idx="1"/>
+          </p:nvPr>
+        </p:nvSpPr>
+        <p:spPr/>
+        <p:txBody>
+          <a:bodyPr/>
+          <a:lstStyle/>
+          <a:p>
+            <a:pPr marL="0" indent="0">
+              <a:buNone/>
+            </a:pPr>
+            <a:r>
+              <a:rPr lang="da-DK" sz="2800"/>
+              <a:t>You get to choose your topic (from a list of four):</a:t>
+            </a:r>
+          </a:p>
+          <a:p>
+            <a:pPr marL="0" indent="0">
+              <a:buNone/>
+            </a:pPr>
+            <a:endParaRPr lang="da-DK"/>
+          </a:p>
+          <a:p>
+            <a:pPr marL="800100" lvl="1" indent="-457200">
+              <a:buFont typeface="+mj-lt"/>
+              <a:buAutoNum type="arabicPeriod"/>
+            </a:pPr>
+            <a:r>
+              <a:rPr lang="da-DK" b="1"/>
+              <a:t>Out-of-core Sorting</a:t>
+            </a:r>
+            <a:r>
+              <a:rPr lang="da-DK"/>
+              <a:t> of ‘Big Data’</a:t>
+            </a:r>
+          </a:p>
+          <a:p>
+            <a:pPr marL="800100" lvl="1" indent="-457200">
+              <a:buFont typeface="+mj-lt"/>
+              <a:buAutoNum type="arabicPeriod"/>
+            </a:pPr>
+            <a:endParaRPr lang="da-DK"/>
+          </a:p>
+          <a:p>
+            <a:pPr marL="800100" lvl="1" indent="-457200">
+              <a:buFont typeface="+mj-lt"/>
+              <a:buAutoNum type="arabicPeriod"/>
+            </a:pPr>
+            <a:r>
+              <a:rPr lang="da-DK" b="1"/>
+              <a:t>Text Mining</a:t>
+            </a:r>
+            <a:r>
+              <a:rPr lang="da-DK"/>
+              <a:t>, using Tries for sorting ‘Big Data’</a:t>
+            </a:r>
+          </a:p>
+          <a:p>
+            <a:pPr marL="800100" lvl="1" indent="-457200">
+              <a:buFont typeface="+mj-lt"/>
+              <a:buAutoNum type="arabicPeriod"/>
+            </a:pPr>
+            <a:endParaRPr lang="da-DK"/>
+          </a:p>
+          <a:p>
+            <a:pPr marL="800100" lvl="1" indent="-457200">
+              <a:buFont typeface="+mj-lt"/>
+              <a:buAutoNum type="arabicPeriod"/>
+            </a:pPr>
+            <a:r>
+              <a:rPr lang="da-DK" b="1"/>
+              <a:t>Error detection/correction</a:t>
+            </a:r>
+            <a:r>
+              <a:rPr lang="da-DK"/>
+              <a:t> in sorting of ‘Big Data’</a:t>
+            </a:r>
+          </a:p>
+          <a:p>
+            <a:pPr marL="800100" lvl="1" indent="-457200">
+              <a:buFont typeface="+mj-lt"/>
+              <a:buAutoNum type="arabicPeriod"/>
+            </a:pPr>
+            <a:endParaRPr lang="da-DK"/>
+          </a:p>
+          <a:p>
+            <a:pPr marL="800100" lvl="1" indent="-457200">
+              <a:buFont typeface="+mj-lt"/>
+              <a:buAutoNum type="arabicPeriod"/>
+            </a:pPr>
+            <a:r>
+              <a:rPr lang="da-DK" b="1"/>
+              <a:t>kD-Tree acceleration</a:t>
+            </a:r>
+            <a:r>
+              <a:rPr lang="da-DK"/>
+              <a:t>, searching kD spaces w/applications</a:t>
+            </a:r>
+          </a:p>
+          <a:p>
+            <a:pPr marL="342900" lvl="1" indent="0">
+              <a:buNone/>
+            </a:pPr>
+            <a:endParaRPr lang="da-DK"/>
+          </a:p>
+        </p:txBody>
+      </p:sp>
+      <p:sp>
+        <p:nvSpPr>
+          <p:cNvPr id="4" name="Date Placeholder 3">
+            <a:extLst>
+              <a:ext uri="{FF2B5EF4-FFF2-40B4-BE49-F238E27FC236}">
+                <a16:creationId xmlns:a16="http://schemas.microsoft.com/office/drawing/2014/main" id="{6A33E1E8-8507-0444-939C-857D55AD9E36}"/>
+              </a:ext>
+            </a:extLst>
+          </p:cNvPr>
+          <p:cNvSpPr>
+            <a:spLocks noGrp="1"/>
+          </p:cNvSpPr>
+          <p:nvPr>
+            <p:ph type="dt" sz="half" idx="10"/>
+          </p:nvPr>
+        </p:nvSpPr>
+        <p:spPr/>
+        <p:txBody>
+          <a:bodyPr/>
+          <a:lstStyle/>
+          <a:p>
+            <a:fld id="{1F043785-D290-9748-90A7-A1F399B02572}" type="datetime1">
+              <a:rPr lang="da-DK"/>
+              <a:t>05/05/2019</a:t>
+            </a:fld>
+            <a:endParaRPr lang="da-DK"/>
+          </a:p>
+        </p:txBody>
+      </p:sp>
+      <p:sp>
+        <p:nvSpPr>
+          <p:cNvPr id="5" name="Footer Placeholder 4">
+            <a:extLst>
+              <a:ext uri="{FF2B5EF4-FFF2-40B4-BE49-F238E27FC236}">
+                <a16:creationId xmlns:a16="http://schemas.microsoft.com/office/drawing/2014/main" id="{C2A161FA-4A4D-F446-8981-224D119F71A0}"/>
+              </a:ext>
+            </a:extLst>
+          </p:cNvPr>
+          <p:cNvSpPr>
+            <a:spLocks noGrp="1"/>
+          </p:cNvSpPr>
+          <p:nvPr>
+            <p:ph type="ftr" sz="quarter" idx="11"/>
+          </p:nvPr>
+        </p:nvSpPr>
+        <p:spPr/>
+        <p:txBody>
+          <a:bodyPr/>
+          <a:lstStyle/>
+          <a:p>
+            <a:r>
+              <a:rPr lang="en"/>
+              <a:t>Algorithms &amp; Data Structures.                            Graphs – Part I</a:t>
+            </a:r>
+            <a:endParaRPr lang="da-DK"/>
+          </a:p>
+        </p:txBody>
+      </p:sp>
+      <p:sp>
+        <p:nvSpPr>
+          <p:cNvPr id="6" name="Slide Number Placeholder 5">
+            <a:extLst>
+              <a:ext uri="{FF2B5EF4-FFF2-40B4-BE49-F238E27FC236}">
+                <a16:creationId xmlns:a16="http://schemas.microsoft.com/office/drawing/2014/main" id="{DD1EED0F-1431-8244-9039-15E1323012EE}"/>
+              </a:ext>
+            </a:extLst>
+          </p:cNvPr>
+          <p:cNvSpPr>
+            <a:spLocks noGrp="1"/>
+          </p:cNvSpPr>
+          <p:nvPr>
+            <p:ph type="sldNum" sz="quarter" idx="12"/>
+          </p:nvPr>
+        </p:nvSpPr>
+        <p:spPr/>
+        <p:txBody>
+          <a:bodyPr/>
+          <a:lstStyle/>
+          <a:p>
+            <a:fld id="{555C5106-4074-1E40-B08D-B64ECC901AC7}" type="slidenum">
+              <a:rPr lang="da-DK" smtClean="0"/>
+              <a:t>4</a:t>
+            </a:fld>
+            <a:endParaRPr lang="da-DK"/>
+          </a:p>
+        </p:txBody>
+      </p:sp>
+    </p:spTree>
+    <p:extLst>
+      <p:ext uri="{BB962C8B-B14F-4D97-AF65-F5344CB8AC3E}">
+        <p14:creationId xmlns:p14="http://schemas.microsoft.com/office/powerpoint/2010/main" val="3693820250"/>
       </p:ext>
     </p:extLst>
   </p:cSld>

</xml_diff>